<commit_message>
Update Apostila - Desenvolvimento Web - IEP.pptx
</commit_message>
<xml_diff>
--- a/documentos/Apostila - Desenvolvimento Web - IEP.pptx
+++ b/documentos/Apostila - Desenvolvimento Web - IEP.pptx
@@ -148,7 +148,7 @@
   </p:defaultTextStyle>
   <p:extLst>
     <p:ext uri="{EFAFB233-063F-42B5-8137-9DF3F51BA10A}">
-      <p15:sldGuideLst xmlns="" xmlns:p15="http://schemas.microsoft.com/office/powerpoint/2012/main"/>
+      <p15:sldGuideLst xmlns:p15="http://schemas.microsoft.com/office/powerpoint/2012/main" xmlns=""/>
     </p:ext>
   </p:extLst>
 </p:presentation>
@@ -12395,7 +12395,7 @@
           <p:cNvPr id="2" name="Título 1">
             <a:extLst>
               <a:ext uri="{FF2B5EF4-FFF2-40B4-BE49-F238E27FC236}">
-                <a16:creationId xmlns="" xmlns:a16="http://schemas.microsoft.com/office/drawing/2014/main" id="{14AB9F69-8D24-468C-93DF-A1666924EB0C}"/>
+                <a16:creationId xmlns:a16="http://schemas.microsoft.com/office/drawing/2014/main" xmlns="" id="{14AB9F69-8D24-468C-93DF-A1666924EB0C}"/>
               </a:ext>
             </a:extLst>
           </p:cNvPr>
@@ -12426,7 +12426,7 @@
           <p:cNvPr id="3" name="Subtítulo 2">
             <a:extLst>
               <a:ext uri="{FF2B5EF4-FFF2-40B4-BE49-F238E27FC236}">
-                <a16:creationId xmlns="" xmlns:a16="http://schemas.microsoft.com/office/drawing/2014/main" id="{0E4BFB9B-D461-4F8E-B2A0-819D63FA7EC4}"/>
+                <a16:creationId xmlns:a16="http://schemas.microsoft.com/office/drawing/2014/main" xmlns="" id="{0E4BFB9B-D461-4F8E-B2A0-819D63FA7EC4}"/>
               </a:ext>
             </a:extLst>
           </p:cNvPr>
@@ -12497,7 +12497,7 @@
           <p:cNvPr id="8" name="Retângulo 7">
             <a:extLst>
               <a:ext uri="{FF2B5EF4-FFF2-40B4-BE49-F238E27FC236}">
-                <a16:creationId xmlns="" xmlns:a16="http://schemas.microsoft.com/office/drawing/2014/main" id="{9B33DD69-1761-43D2-B589-CE56D2C4FBB6}"/>
+                <a16:creationId xmlns:a16="http://schemas.microsoft.com/office/drawing/2014/main" xmlns="" id="{9B33DD69-1761-43D2-B589-CE56D2C4FBB6}"/>
               </a:ext>
             </a:extLst>
           </p:cNvPr>
@@ -12551,7 +12551,7 @@
           <p:cNvPr id="24" name="CaixaDeTexto 23">
             <a:extLst>
               <a:ext uri="{FF2B5EF4-FFF2-40B4-BE49-F238E27FC236}">
-                <a16:creationId xmlns="" xmlns:a16="http://schemas.microsoft.com/office/drawing/2014/main" id="{90B980A2-8D40-4C0A-9871-4FA9794F9C3D}"/>
+                <a16:creationId xmlns:a16="http://schemas.microsoft.com/office/drawing/2014/main" xmlns="" id="{90B980A2-8D40-4C0A-9871-4FA9794F9C3D}"/>
               </a:ext>
             </a:extLst>
           </p:cNvPr>
@@ -13022,7 +13022,7 @@
           <p:cNvPr id="8" name="Retângulo 7">
             <a:extLst>
               <a:ext uri="{FF2B5EF4-FFF2-40B4-BE49-F238E27FC236}">
-                <a16:creationId xmlns="" xmlns:a16="http://schemas.microsoft.com/office/drawing/2014/main" id="{9B33DD69-1761-43D2-B589-CE56D2C4FBB6}"/>
+                <a16:creationId xmlns:a16="http://schemas.microsoft.com/office/drawing/2014/main" xmlns="" id="{9B33DD69-1761-43D2-B589-CE56D2C4FBB6}"/>
               </a:ext>
             </a:extLst>
           </p:cNvPr>
@@ -13076,7 +13076,7 @@
           <p:cNvPr id="24" name="CaixaDeTexto 23">
             <a:extLst>
               <a:ext uri="{FF2B5EF4-FFF2-40B4-BE49-F238E27FC236}">
-                <a16:creationId xmlns="" xmlns:a16="http://schemas.microsoft.com/office/drawing/2014/main" id="{90B980A2-8D40-4C0A-9871-4FA9794F9C3D}"/>
+                <a16:creationId xmlns:a16="http://schemas.microsoft.com/office/drawing/2014/main" xmlns="" id="{90B980A2-8D40-4C0A-9871-4FA9794F9C3D}"/>
               </a:ext>
             </a:extLst>
           </p:cNvPr>
@@ -13546,7 +13546,7 @@
           <p:cNvPr id="8" name="Retângulo 7">
             <a:extLst>
               <a:ext uri="{FF2B5EF4-FFF2-40B4-BE49-F238E27FC236}">
-                <a16:creationId xmlns="" xmlns:a16="http://schemas.microsoft.com/office/drawing/2014/main" id="{9B33DD69-1761-43D2-B589-CE56D2C4FBB6}"/>
+                <a16:creationId xmlns:a16="http://schemas.microsoft.com/office/drawing/2014/main" xmlns="" id="{9B33DD69-1761-43D2-B589-CE56D2C4FBB6}"/>
               </a:ext>
             </a:extLst>
           </p:cNvPr>
@@ -13600,7 +13600,7 @@
           <p:cNvPr id="24" name="CaixaDeTexto 23">
             <a:extLst>
               <a:ext uri="{FF2B5EF4-FFF2-40B4-BE49-F238E27FC236}">
-                <a16:creationId xmlns="" xmlns:a16="http://schemas.microsoft.com/office/drawing/2014/main" id="{90B980A2-8D40-4C0A-9871-4FA9794F9C3D}"/>
+                <a16:creationId xmlns:a16="http://schemas.microsoft.com/office/drawing/2014/main" xmlns="" id="{90B980A2-8D40-4C0A-9871-4FA9794F9C3D}"/>
               </a:ext>
             </a:extLst>
           </p:cNvPr>
@@ -14354,7 +14354,7 @@
           <p:cNvPr id="8" name="Retângulo 7">
             <a:extLst>
               <a:ext uri="{FF2B5EF4-FFF2-40B4-BE49-F238E27FC236}">
-                <a16:creationId xmlns="" xmlns:a16="http://schemas.microsoft.com/office/drawing/2014/main" id="{9B33DD69-1761-43D2-B589-CE56D2C4FBB6}"/>
+                <a16:creationId xmlns:a16="http://schemas.microsoft.com/office/drawing/2014/main" xmlns="" id="{9B33DD69-1761-43D2-B589-CE56D2C4FBB6}"/>
               </a:ext>
             </a:extLst>
           </p:cNvPr>
@@ -14408,7 +14408,7 @@
           <p:cNvPr id="24" name="CaixaDeTexto 23">
             <a:extLst>
               <a:ext uri="{FF2B5EF4-FFF2-40B4-BE49-F238E27FC236}">
-                <a16:creationId xmlns="" xmlns:a16="http://schemas.microsoft.com/office/drawing/2014/main" id="{90B980A2-8D40-4C0A-9871-4FA9794F9C3D}"/>
+                <a16:creationId xmlns:a16="http://schemas.microsoft.com/office/drawing/2014/main" xmlns="" id="{90B980A2-8D40-4C0A-9871-4FA9794F9C3D}"/>
               </a:ext>
             </a:extLst>
           </p:cNvPr>
@@ -14932,7 +14932,7 @@
           <p:cNvPr id="2" name="Título 1">
             <a:extLst>
               <a:ext uri="{FF2B5EF4-FFF2-40B4-BE49-F238E27FC236}">
-                <a16:creationId xmlns="" xmlns:a16="http://schemas.microsoft.com/office/drawing/2014/main" id="{14AB9F69-8D24-468C-93DF-A1666924EB0C}"/>
+                <a16:creationId xmlns:a16="http://schemas.microsoft.com/office/drawing/2014/main" xmlns="" id="{14AB9F69-8D24-468C-93DF-A1666924EB0C}"/>
               </a:ext>
             </a:extLst>
           </p:cNvPr>
@@ -14963,7 +14963,7 @@
           <p:cNvPr id="3" name="Subtítulo 2">
             <a:extLst>
               <a:ext uri="{FF2B5EF4-FFF2-40B4-BE49-F238E27FC236}">
-                <a16:creationId xmlns="" xmlns:a16="http://schemas.microsoft.com/office/drawing/2014/main" id="{0E4BFB9B-D461-4F8E-B2A0-819D63FA7EC4}"/>
+                <a16:creationId xmlns:a16="http://schemas.microsoft.com/office/drawing/2014/main" xmlns="" id="{0E4BFB9B-D461-4F8E-B2A0-819D63FA7EC4}"/>
               </a:ext>
             </a:extLst>
           </p:cNvPr>
@@ -15034,7 +15034,7 @@
           <p:cNvPr id="8" name="Retângulo 7">
             <a:extLst>
               <a:ext uri="{FF2B5EF4-FFF2-40B4-BE49-F238E27FC236}">
-                <a16:creationId xmlns="" xmlns:a16="http://schemas.microsoft.com/office/drawing/2014/main" id="{9B33DD69-1761-43D2-B589-CE56D2C4FBB6}"/>
+                <a16:creationId xmlns:a16="http://schemas.microsoft.com/office/drawing/2014/main" xmlns="" id="{9B33DD69-1761-43D2-B589-CE56D2C4FBB6}"/>
               </a:ext>
             </a:extLst>
           </p:cNvPr>
@@ -15088,7 +15088,7 @@
           <p:cNvPr id="24" name="CaixaDeTexto 23">
             <a:extLst>
               <a:ext uri="{FF2B5EF4-FFF2-40B4-BE49-F238E27FC236}">
-                <a16:creationId xmlns="" xmlns:a16="http://schemas.microsoft.com/office/drawing/2014/main" id="{90B980A2-8D40-4C0A-9871-4FA9794F9C3D}"/>
+                <a16:creationId xmlns:a16="http://schemas.microsoft.com/office/drawing/2014/main" xmlns="" id="{90B980A2-8D40-4C0A-9871-4FA9794F9C3D}"/>
               </a:ext>
             </a:extLst>
           </p:cNvPr>
@@ -15677,7 +15677,7 @@
           <p:cNvPr id="8" name="Retângulo 7">
             <a:extLst>
               <a:ext uri="{FF2B5EF4-FFF2-40B4-BE49-F238E27FC236}">
-                <a16:creationId xmlns="" xmlns:a16="http://schemas.microsoft.com/office/drawing/2014/main" id="{9B33DD69-1761-43D2-B589-CE56D2C4FBB6}"/>
+                <a16:creationId xmlns:a16="http://schemas.microsoft.com/office/drawing/2014/main" xmlns="" id="{9B33DD69-1761-43D2-B589-CE56D2C4FBB6}"/>
               </a:ext>
             </a:extLst>
           </p:cNvPr>
@@ -15731,7 +15731,7 @@
           <p:cNvPr id="24" name="CaixaDeTexto 23">
             <a:extLst>
               <a:ext uri="{FF2B5EF4-FFF2-40B4-BE49-F238E27FC236}">
-                <a16:creationId xmlns="" xmlns:a16="http://schemas.microsoft.com/office/drawing/2014/main" id="{90B980A2-8D40-4C0A-9871-4FA9794F9C3D}"/>
+                <a16:creationId xmlns:a16="http://schemas.microsoft.com/office/drawing/2014/main" xmlns="" id="{90B980A2-8D40-4C0A-9871-4FA9794F9C3D}"/>
               </a:ext>
             </a:extLst>
           </p:cNvPr>
@@ -16177,7 +16177,7 @@
           <p:cNvPr id="8" name="Retângulo 7">
             <a:extLst>
               <a:ext uri="{FF2B5EF4-FFF2-40B4-BE49-F238E27FC236}">
-                <a16:creationId xmlns="" xmlns:a16="http://schemas.microsoft.com/office/drawing/2014/main" id="{9B33DD69-1761-43D2-B589-CE56D2C4FBB6}"/>
+                <a16:creationId xmlns:a16="http://schemas.microsoft.com/office/drawing/2014/main" xmlns="" id="{9B33DD69-1761-43D2-B589-CE56D2C4FBB6}"/>
               </a:ext>
             </a:extLst>
           </p:cNvPr>
@@ -16231,7 +16231,7 @@
           <p:cNvPr id="24" name="CaixaDeTexto 23">
             <a:extLst>
               <a:ext uri="{FF2B5EF4-FFF2-40B4-BE49-F238E27FC236}">
-                <a16:creationId xmlns="" xmlns:a16="http://schemas.microsoft.com/office/drawing/2014/main" id="{90B980A2-8D40-4C0A-9871-4FA9794F9C3D}"/>
+                <a16:creationId xmlns:a16="http://schemas.microsoft.com/office/drawing/2014/main" xmlns="" id="{90B980A2-8D40-4C0A-9871-4FA9794F9C3D}"/>
               </a:ext>
             </a:extLst>
           </p:cNvPr>
@@ -16631,7 +16631,7 @@
           <p:cNvPr id="8" name="Retângulo 7">
             <a:extLst>
               <a:ext uri="{FF2B5EF4-FFF2-40B4-BE49-F238E27FC236}">
-                <a16:creationId xmlns="" xmlns:a16="http://schemas.microsoft.com/office/drawing/2014/main" id="{9B33DD69-1761-43D2-B589-CE56D2C4FBB6}"/>
+                <a16:creationId xmlns:a16="http://schemas.microsoft.com/office/drawing/2014/main" xmlns="" id="{9B33DD69-1761-43D2-B589-CE56D2C4FBB6}"/>
               </a:ext>
             </a:extLst>
           </p:cNvPr>
@@ -16685,7 +16685,7 @@
           <p:cNvPr id="24" name="CaixaDeTexto 23">
             <a:extLst>
               <a:ext uri="{FF2B5EF4-FFF2-40B4-BE49-F238E27FC236}">
-                <a16:creationId xmlns="" xmlns:a16="http://schemas.microsoft.com/office/drawing/2014/main" id="{90B980A2-8D40-4C0A-9871-4FA9794F9C3D}"/>
+                <a16:creationId xmlns:a16="http://schemas.microsoft.com/office/drawing/2014/main" xmlns="" id="{90B980A2-8D40-4C0A-9871-4FA9794F9C3D}"/>
               </a:ext>
             </a:extLst>
           </p:cNvPr>
@@ -16968,7 +16968,7 @@
           <p:cNvPr id="8" name="Retângulo 7">
             <a:extLst>
               <a:ext uri="{FF2B5EF4-FFF2-40B4-BE49-F238E27FC236}">
-                <a16:creationId xmlns="" xmlns:a16="http://schemas.microsoft.com/office/drawing/2014/main" id="{9B33DD69-1761-43D2-B589-CE56D2C4FBB6}"/>
+                <a16:creationId xmlns:a16="http://schemas.microsoft.com/office/drawing/2014/main" xmlns="" id="{9B33DD69-1761-43D2-B589-CE56D2C4FBB6}"/>
               </a:ext>
             </a:extLst>
           </p:cNvPr>
@@ -17022,7 +17022,7 @@
           <p:cNvPr id="24" name="CaixaDeTexto 23">
             <a:extLst>
               <a:ext uri="{FF2B5EF4-FFF2-40B4-BE49-F238E27FC236}">
-                <a16:creationId xmlns="" xmlns:a16="http://schemas.microsoft.com/office/drawing/2014/main" id="{90B980A2-8D40-4C0A-9871-4FA9794F9C3D}"/>
+                <a16:creationId xmlns:a16="http://schemas.microsoft.com/office/drawing/2014/main" xmlns="" id="{90B980A2-8D40-4C0A-9871-4FA9794F9C3D}"/>
               </a:ext>
             </a:extLst>
           </p:cNvPr>
@@ -17286,7 +17286,7 @@
           <p:cNvPr id="2" name="Título 1">
             <a:extLst>
               <a:ext uri="{FF2B5EF4-FFF2-40B4-BE49-F238E27FC236}">
-                <a16:creationId xmlns="" xmlns:a16="http://schemas.microsoft.com/office/drawing/2014/main" id="{14AB9F69-8D24-468C-93DF-A1666924EB0C}"/>
+                <a16:creationId xmlns:a16="http://schemas.microsoft.com/office/drawing/2014/main" xmlns="" id="{14AB9F69-8D24-468C-93DF-A1666924EB0C}"/>
               </a:ext>
             </a:extLst>
           </p:cNvPr>
@@ -17317,7 +17317,7 @@
           <p:cNvPr id="3" name="Subtítulo 2">
             <a:extLst>
               <a:ext uri="{FF2B5EF4-FFF2-40B4-BE49-F238E27FC236}">
-                <a16:creationId xmlns="" xmlns:a16="http://schemas.microsoft.com/office/drawing/2014/main" id="{0E4BFB9B-D461-4F8E-B2A0-819D63FA7EC4}"/>
+                <a16:creationId xmlns:a16="http://schemas.microsoft.com/office/drawing/2014/main" xmlns="" id="{0E4BFB9B-D461-4F8E-B2A0-819D63FA7EC4}"/>
               </a:ext>
             </a:extLst>
           </p:cNvPr>
@@ -17388,7 +17388,7 @@
           <p:cNvPr id="8" name="Retângulo 7">
             <a:extLst>
               <a:ext uri="{FF2B5EF4-FFF2-40B4-BE49-F238E27FC236}">
-                <a16:creationId xmlns="" xmlns:a16="http://schemas.microsoft.com/office/drawing/2014/main" id="{9B33DD69-1761-43D2-B589-CE56D2C4FBB6}"/>
+                <a16:creationId xmlns:a16="http://schemas.microsoft.com/office/drawing/2014/main" xmlns="" id="{9B33DD69-1761-43D2-B589-CE56D2C4FBB6}"/>
               </a:ext>
             </a:extLst>
           </p:cNvPr>
@@ -17442,7 +17442,7 @@
           <p:cNvPr id="24" name="CaixaDeTexto 23">
             <a:extLst>
               <a:ext uri="{FF2B5EF4-FFF2-40B4-BE49-F238E27FC236}">
-                <a16:creationId xmlns="" xmlns:a16="http://schemas.microsoft.com/office/drawing/2014/main" id="{90B980A2-8D40-4C0A-9871-4FA9794F9C3D}"/>
+                <a16:creationId xmlns:a16="http://schemas.microsoft.com/office/drawing/2014/main" xmlns="" id="{90B980A2-8D40-4C0A-9871-4FA9794F9C3D}"/>
               </a:ext>
             </a:extLst>
           </p:cNvPr>
@@ -17724,7 +17724,7 @@
           <p:cNvPr id="8" name="Retângulo 7">
             <a:extLst>
               <a:ext uri="{FF2B5EF4-FFF2-40B4-BE49-F238E27FC236}">
-                <a16:creationId xmlns="" xmlns:a16="http://schemas.microsoft.com/office/drawing/2014/main" id="{9B33DD69-1761-43D2-B589-CE56D2C4FBB6}"/>
+                <a16:creationId xmlns:a16="http://schemas.microsoft.com/office/drawing/2014/main" xmlns="" id="{9B33DD69-1761-43D2-B589-CE56D2C4FBB6}"/>
               </a:ext>
             </a:extLst>
           </p:cNvPr>
@@ -17778,7 +17778,7 @@
           <p:cNvPr id="24" name="CaixaDeTexto 23">
             <a:extLst>
               <a:ext uri="{FF2B5EF4-FFF2-40B4-BE49-F238E27FC236}">
-                <a16:creationId xmlns="" xmlns:a16="http://schemas.microsoft.com/office/drawing/2014/main" id="{90B980A2-8D40-4C0A-9871-4FA9794F9C3D}"/>
+                <a16:creationId xmlns:a16="http://schemas.microsoft.com/office/drawing/2014/main" xmlns="" id="{90B980A2-8D40-4C0A-9871-4FA9794F9C3D}"/>
               </a:ext>
             </a:extLst>
           </p:cNvPr>
@@ -18307,7 +18307,7 @@
           <p:cNvPr id="8" name="Retângulo 7">
             <a:extLst>
               <a:ext uri="{FF2B5EF4-FFF2-40B4-BE49-F238E27FC236}">
-                <a16:creationId xmlns="" xmlns:a16="http://schemas.microsoft.com/office/drawing/2014/main" id="{9B33DD69-1761-43D2-B589-CE56D2C4FBB6}"/>
+                <a16:creationId xmlns:a16="http://schemas.microsoft.com/office/drawing/2014/main" xmlns="" id="{9B33DD69-1761-43D2-B589-CE56D2C4FBB6}"/>
               </a:ext>
             </a:extLst>
           </p:cNvPr>
@@ -18361,7 +18361,7 @@
           <p:cNvPr id="24" name="CaixaDeTexto 23">
             <a:extLst>
               <a:ext uri="{FF2B5EF4-FFF2-40B4-BE49-F238E27FC236}">
-                <a16:creationId xmlns="" xmlns:a16="http://schemas.microsoft.com/office/drawing/2014/main" id="{90B980A2-8D40-4C0A-9871-4FA9794F9C3D}"/>
+                <a16:creationId xmlns:a16="http://schemas.microsoft.com/office/drawing/2014/main" xmlns="" id="{90B980A2-8D40-4C0A-9871-4FA9794F9C3D}"/>
               </a:ext>
             </a:extLst>
           </p:cNvPr>
@@ -18944,7 +18944,7 @@
           <p:cNvPr id="8" name="Retângulo 7">
             <a:extLst>
               <a:ext uri="{FF2B5EF4-FFF2-40B4-BE49-F238E27FC236}">
-                <a16:creationId xmlns="" xmlns:a16="http://schemas.microsoft.com/office/drawing/2014/main" id="{9B33DD69-1761-43D2-B589-CE56D2C4FBB6}"/>
+                <a16:creationId xmlns:a16="http://schemas.microsoft.com/office/drawing/2014/main" xmlns="" id="{9B33DD69-1761-43D2-B589-CE56D2C4FBB6}"/>
               </a:ext>
             </a:extLst>
           </p:cNvPr>
@@ -18998,7 +18998,7 @@
           <p:cNvPr id="24" name="CaixaDeTexto 23">
             <a:extLst>
               <a:ext uri="{FF2B5EF4-FFF2-40B4-BE49-F238E27FC236}">
-                <a16:creationId xmlns="" xmlns:a16="http://schemas.microsoft.com/office/drawing/2014/main" id="{90B980A2-8D40-4C0A-9871-4FA9794F9C3D}"/>
+                <a16:creationId xmlns:a16="http://schemas.microsoft.com/office/drawing/2014/main" xmlns="" id="{90B980A2-8D40-4C0A-9871-4FA9794F9C3D}"/>
               </a:ext>
             </a:extLst>
           </p:cNvPr>
@@ -19425,7 +19425,7 @@
           <p:cNvPr id="8" name="Retângulo 7">
             <a:extLst>
               <a:ext uri="{FF2B5EF4-FFF2-40B4-BE49-F238E27FC236}">
-                <a16:creationId xmlns="" xmlns:a16="http://schemas.microsoft.com/office/drawing/2014/main" id="{9B33DD69-1761-43D2-B589-CE56D2C4FBB6}"/>
+                <a16:creationId xmlns:a16="http://schemas.microsoft.com/office/drawing/2014/main" xmlns="" id="{9B33DD69-1761-43D2-B589-CE56D2C4FBB6}"/>
               </a:ext>
             </a:extLst>
           </p:cNvPr>
@@ -19479,7 +19479,7 @@
           <p:cNvPr id="24" name="CaixaDeTexto 23">
             <a:extLst>
               <a:ext uri="{FF2B5EF4-FFF2-40B4-BE49-F238E27FC236}">
-                <a16:creationId xmlns="" xmlns:a16="http://schemas.microsoft.com/office/drawing/2014/main" id="{90B980A2-8D40-4C0A-9871-4FA9794F9C3D}"/>
+                <a16:creationId xmlns:a16="http://schemas.microsoft.com/office/drawing/2014/main" xmlns="" id="{90B980A2-8D40-4C0A-9871-4FA9794F9C3D}"/>
               </a:ext>
             </a:extLst>
           </p:cNvPr>
@@ -19771,7 +19771,7 @@
           <p:cNvPr id="8" name="Retângulo 7">
             <a:extLst>
               <a:ext uri="{FF2B5EF4-FFF2-40B4-BE49-F238E27FC236}">
-                <a16:creationId xmlns="" xmlns:a16="http://schemas.microsoft.com/office/drawing/2014/main" id="{9B33DD69-1761-43D2-B589-CE56D2C4FBB6}"/>
+                <a16:creationId xmlns:a16="http://schemas.microsoft.com/office/drawing/2014/main" xmlns="" id="{9B33DD69-1761-43D2-B589-CE56D2C4FBB6}"/>
               </a:ext>
             </a:extLst>
           </p:cNvPr>
@@ -19829,7 +19829,7 @@
           <p:cNvPr id="24" name="CaixaDeTexto 23">
             <a:extLst>
               <a:ext uri="{FF2B5EF4-FFF2-40B4-BE49-F238E27FC236}">
-                <a16:creationId xmlns="" xmlns:a16="http://schemas.microsoft.com/office/drawing/2014/main" id="{90B980A2-8D40-4C0A-9871-4FA9794F9C3D}"/>
+                <a16:creationId xmlns:a16="http://schemas.microsoft.com/office/drawing/2014/main" xmlns="" id="{90B980A2-8D40-4C0A-9871-4FA9794F9C3D}"/>
               </a:ext>
             </a:extLst>
           </p:cNvPr>
@@ -20658,7 +20658,7 @@
           <p:cNvPr id="8" name="Retângulo 7">
             <a:extLst>
               <a:ext uri="{FF2B5EF4-FFF2-40B4-BE49-F238E27FC236}">
-                <a16:creationId xmlns="" xmlns:a16="http://schemas.microsoft.com/office/drawing/2014/main" id="{9B33DD69-1761-43D2-B589-CE56D2C4FBB6}"/>
+                <a16:creationId xmlns:a16="http://schemas.microsoft.com/office/drawing/2014/main" xmlns="" id="{9B33DD69-1761-43D2-B589-CE56D2C4FBB6}"/>
               </a:ext>
             </a:extLst>
           </p:cNvPr>
@@ -20716,7 +20716,7 @@
           <p:cNvPr id="24" name="CaixaDeTexto 23">
             <a:extLst>
               <a:ext uri="{FF2B5EF4-FFF2-40B4-BE49-F238E27FC236}">
-                <a16:creationId xmlns="" xmlns:a16="http://schemas.microsoft.com/office/drawing/2014/main" id="{90B980A2-8D40-4C0A-9871-4FA9794F9C3D}"/>
+                <a16:creationId xmlns:a16="http://schemas.microsoft.com/office/drawing/2014/main" xmlns="" id="{90B980A2-8D40-4C0A-9871-4FA9794F9C3D}"/>
               </a:ext>
             </a:extLst>
           </p:cNvPr>
@@ -21163,7 +21163,7 @@
           <p:cNvPr id="8" name="Retângulo 7">
             <a:extLst>
               <a:ext uri="{FF2B5EF4-FFF2-40B4-BE49-F238E27FC236}">
-                <a16:creationId xmlns="" xmlns:a16="http://schemas.microsoft.com/office/drawing/2014/main" id="{9B33DD69-1761-43D2-B589-CE56D2C4FBB6}"/>
+                <a16:creationId xmlns:a16="http://schemas.microsoft.com/office/drawing/2014/main" xmlns="" id="{9B33DD69-1761-43D2-B589-CE56D2C4FBB6}"/>
               </a:ext>
             </a:extLst>
           </p:cNvPr>
@@ -21221,7 +21221,7 @@
           <p:cNvPr id="24" name="CaixaDeTexto 23">
             <a:extLst>
               <a:ext uri="{FF2B5EF4-FFF2-40B4-BE49-F238E27FC236}">
-                <a16:creationId xmlns="" xmlns:a16="http://schemas.microsoft.com/office/drawing/2014/main" id="{90B980A2-8D40-4C0A-9871-4FA9794F9C3D}"/>
+                <a16:creationId xmlns:a16="http://schemas.microsoft.com/office/drawing/2014/main" xmlns="" id="{90B980A2-8D40-4C0A-9871-4FA9794F9C3D}"/>
               </a:ext>
             </a:extLst>
           </p:cNvPr>
@@ -21500,7 +21500,7 @@
           <p:cNvPr id="8" name="Retângulo 7">
             <a:extLst>
               <a:ext uri="{FF2B5EF4-FFF2-40B4-BE49-F238E27FC236}">
-                <a16:creationId xmlns="" xmlns:a16="http://schemas.microsoft.com/office/drawing/2014/main" id="{9B33DD69-1761-43D2-B589-CE56D2C4FBB6}"/>
+                <a16:creationId xmlns:a16="http://schemas.microsoft.com/office/drawing/2014/main" xmlns="" id="{9B33DD69-1761-43D2-B589-CE56D2C4FBB6}"/>
               </a:ext>
             </a:extLst>
           </p:cNvPr>
@@ -21558,7 +21558,7 @@
           <p:cNvPr id="24" name="CaixaDeTexto 23">
             <a:extLst>
               <a:ext uri="{FF2B5EF4-FFF2-40B4-BE49-F238E27FC236}">
-                <a16:creationId xmlns="" xmlns:a16="http://schemas.microsoft.com/office/drawing/2014/main" id="{90B980A2-8D40-4C0A-9871-4FA9794F9C3D}"/>
+                <a16:creationId xmlns:a16="http://schemas.microsoft.com/office/drawing/2014/main" xmlns="" id="{90B980A2-8D40-4C0A-9871-4FA9794F9C3D}"/>
               </a:ext>
             </a:extLst>
           </p:cNvPr>
@@ -21949,7 +21949,7 @@
           <p:cNvPr id="8" name="Retângulo 7">
             <a:extLst>
               <a:ext uri="{FF2B5EF4-FFF2-40B4-BE49-F238E27FC236}">
-                <a16:creationId xmlns="" xmlns:a16="http://schemas.microsoft.com/office/drawing/2014/main" id="{9B33DD69-1761-43D2-B589-CE56D2C4FBB6}"/>
+                <a16:creationId xmlns:a16="http://schemas.microsoft.com/office/drawing/2014/main" xmlns="" id="{9B33DD69-1761-43D2-B589-CE56D2C4FBB6}"/>
               </a:ext>
             </a:extLst>
           </p:cNvPr>
@@ -22007,7 +22007,7 @@
           <p:cNvPr id="24" name="CaixaDeTexto 23">
             <a:extLst>
               <a:ext uri="{FF2B5EF4-FFF2-40B4-BE49-F238E27FC236}">
-                <a16:creationId xmlns="" xmlns:a16="http://schemas.microsoft.com/office/drawing/2014/main" id="{90B980A2-8D40-4C0A-9871-4FA9794F9C3D}"/>
+                <a16:creationId xmlns:a16="http://schemas.microsoft.com/office/drawing/2014/main" xmlns="" id="{90B980A2-8D40-4C0A-9871-4FA9794F9C3D}"/>
               </a:ext>
             </a:extLst>
           </p:cNvPr>
@@ -22684,7 +22684,7 @@
           <p:cNvPr id="8" name="Retângulo 7">
             <a:extLst>
               <a:ext uri="{FF2B5EF4-FFF2-40B4-BE49-F238E27FC236}">
-                <a16:creationId xmlns="" xmlns:a16="http://schemas.microsoft.com/office/drawing/2014/main" id="{9B33DD69-1761-43D2-B589-CE56D2C4FBB6}"/>
+                <a16:creationId xmlns:a16="http://schemas.microsoft.com/office/drawing/2014/main" xmlns="" id="{9B33DD69-1761-43D2-B589-CE56D2C4FBB6}"/>
               </a:ext>
             </a:extLst>
           </p:cNvPr>
@@ -22738,7 +22738,7 @@
           <p:cNvPr id="24" name="CaixaDeTexto 23">
             <a:extLst>
               <a:ext uri="{FF2B5EF4-FFF2-40B4-BE49-F238E27FC236}">
-                <a16:creationId xmlns="" xmlns:a16="http://schemas.microsoft.com/office/drawing/2014/main" id="{90B980A2-8D40-4C0A-9871-4FA9794F9C3D}"/>
+                <a16:creationId xmlns:a16="http://schemas.microsoft.com/office/drawing/2014/main" xmlns="" id="{90B980A2-8D40-4C0A-9871-4FA9794F9C3D}"/>
               </a:ext>
             </a:extLst>
           </p:cNvPr>
@@ -23057,7 +23057,7 @@
           <p:cNvPr id="2" name="Título 1">
             <a:extLst>
               <a:ext uri="{FF2B5EF4-FFF2-40B4-BE49-F238E27FC236}">
-                <a16:creationId xmlns="" xmlns:a16="http://schemas.microsoft.com/office/drawing/2014/main" id="{14AB9F69-8D24-468C-93DF-A1666924EB0C}"/>
+                <a16:creationId xmlns:a16="http://schemas.microsoft.com/office/drawing/2014/main" xmlns="" id="{14AB9F69-8D24-468C-93DF-A1666924EB0C}"/>
               </a:ext>
             </a:extLst>
           </p:cNvPr>
@@ -23088,7 +23088,7 @@
           <p:cNvPr id="3" name="Subtítulo 2">
             <a:extLst>
               <a:ext uri="{FF2B5EF4-FFF2-40B4-BE49-F238E27FC236}">
-                <a16:creationId xmlns="" xmlns:a16="http://schemas.microsoft.com/office/drawing/2014/main" id="{0E4BFB9B-D461-4F8E-B2A0-819D63FA7EC4}"/>
+                <a16:creationId xmlns:a16="http://schemas.microsoft.com/office/drawing/2014/main" xmlns="" id="{0E4BFB9B-D461-4F8E-B2A0-819D63FA7EC4}"/>
               </a:ext>
             </a:extLst>
           </p:cNvPr>
@@ -23159,7 +23159,7 @@
           <p:cNvPr id="8" name="Retângulo 7">
             <a:extLst>
               <a:ext uri="{FF2B5EF4-FFF2-40B4-BE49-F238E27FC236}">
-                <a16:creationId xmlns="" xmlns:a16="http://schemas.microsoft.com/office/drawing/2014/main" id="{9B33DD69-1761-43D2-B589-CE56D2C4FBB6}"/>
+                <a16:creationId xmlns:a16="http://schemas.microsoft.com/office/drawing/2014/main" xmlns="" id="{9B33DD69-1761-43D2-B589-CE56D2C4FBB6}"/>
               </a:ext>
             </a:extLst>
           </p:cNvPr>
@@ -23295,7 +23295,7 @@
           <p:cNvPr id="9" name="CaixaDeTexto 8">
             <a:extLst>
               <a:ext uri="{FF2B5EF4-FFF2-40B4-BE49-F238E27FC236}">
-                <a16:creationId xmlns="" xmlns:a16="http://schemas.microsoft.com/office/drawing/2014/main" id="{90B980A2-8D40-4C0A-9871-4FA9794F9C3D}"/>
+                <a16:creationId xmlns:a16="http://schemas.microsoft.com/office/drawing/2014/main" xmlns="" id="{90B980A2-8D40-4C0A-9871-4FA9794F9C3D}"/>
               </a:ext>
             </a:extLst>
           </p:cNvPr>
@@ -23714,7 +23714,7 @@
           <p:cNvPr id="2" name="Título 1">
             <a:extLst>
               <a:ext uri="{FF2B5EF4-FFF2-40B4-BE49-F238E27FC236}">
-                <a16:creationId xmlns="" xmlns:a16="http://schemas.microsoft.com/office/drawing/2014/main" id="{14AB9F69-8D24-468C-93DF-A1666924EB0C}"/>
+                <a16:creationId xmlns:a16="http://schemas.microsoft.com/office/drawing/2014/main" xmlns="" id="{14AB9F69-8D24-468C-93DF-A1666924EB0C}"/>
               </a:ext>
             </a:extLst>
           </p:cNvPr>
@@ -23745,7 +23745,7 @@
           <p:cNvPr id="3" name="Subtítulo 2">
             <a:extLst>
               <a:ext uri="{FF2B5EF4-FFF2-40B4-BE49-F238E27FC236}">
-                <a16:creationId xmlns="" xmlns:a16="http://schemas.microsoft.com/office/drawing/2014/main" id="{0E4BFB9B-D461-4F8E-B2A0-819D63FA7EC4}"/>
+                <a16:creationId xmlns:a16="http://schemas.microsoft.com/office/drawing/2014/main" xmlns="" id="{0E4BFB9B-D461-4F8E-B2A0-819D63FA7EC4}"/>
               </a:ext>
             </a:extLst>
           </p:cNvPr>
@@ -23816,7 +23816,7 @@
           <p:cNvPr id="8" name="Retângulo 7">
             <a:extLst>
               <a:ext uri="{FF2B5EF4-FFF2-40B4-BE49-F238E27FC236}">
-                <a16:creationId xmlns="" xmlns:a16="http://schemas.microsoft.com/office/drawing/2014/main" id="{9B33DD69-1761-43D2-B589-CE56D2C4FBB6}"/>
+                <a16:creationId xmlns:a16="http://schemas.microsoft.com/office/drawing/2014/main" xmlns="" id="{9B33DD69-1761-43D2-B589-CE56D2C4FBB6}"/>
               </a:ext>
             </a:extLst>
           </p:cNvPr>
@@ -23952,7 +23952,7 @@
           <p:cNvPr id="9" name="CaixaDeTexto 8">
             <a:extLst>
               <a:ext uri="{FF2B5EF4-FFF2-40B4-BE49-F238E27FC236}">
-                <a16:creationId xmlns="" xmlns:a16="http://schemas.microsoft.com/office/drawing/2014/main" id="{90B980A2-8D40-4C0A-9871-4FA9794F9C3D}"/>
+                <a16:creationId xmlns:a16="http://schemas.microsoft.com/office/drawing/2014/main" xmlns="" id="{90B980A2-8D40-4C0A-9871-4FA9794F9C3D}"/>
               </a:ext>
             </a:extLst>
           </p:cNvPr>
@@ -24022,14 +24022,6 @@
               </a:rPr>
               <a:t>:</a:t>
             </a:r>
-            <a:endParaRPr lang="pt-BR" sz="2000" dirty="0" smtClean="0">
-              <a:solidFill>
-                <a:schemeClr val="bg1">
-                  <a:lumMod val="95000"/>
-                  <a:lumOff val="5000"/>
-                </a:schemeClr>
-              </a:solidFill>
-            </a:endParaRPr>
           </a:p>
         </p:txBody>
       </p:sp>
@@ -24139,7 +24131,7 @@
           <p:cNvPr id="8" name="Retângulo 7">
             <a:extLst>
               <a:ext uri="{FF2B5EF4-FFF2-40B4-BE49-F238E27FC236}">
-                <a16:creationId xmlns="" xmlns:a16="http://schemas.microsoft.com/office/drawing/2014/main" id="{9B33DD69-1761-43D2-B589-CE56D2C4FBB6}"/>
+                <a16:creationId xmlns:a16="http://schemas.microsoft.com/office/drawing/2014/main" xmlns="" id="{9B33DD69-1761-43D2-B589-CE56D2C4FBB6}"/>
               </a:ext>
             </a:extLst>
           </p:cNvPr>
@@ -24275,7 +24267,7 @@
           <p:cNvPr id="9" name="CaixaDeTexto 8">
             <a:extLst>
               <a:ext uri="{FF2B5EF4-FFF2-40B4-BE49-F238E27FC236}">
-                <a16:creationId xmlns="" xmlns:a16="http://schemas.microsoft.com/office/drawing/2014/main" id="{90B980A2-8D40-4C0A-9871-4FA9794F9C3D}"/>
+                <a16:creationId xmlns:a16="http://schemas.microsoft.com/office/drawing/2014/main" xmlns="" id="{90B980A2-8D40-4C0A-9871-4FA9794F9C3D}"/>
               </a:ext>
             </a:extLst>
           </p:cNvPr>
@@ -24463,7 +24455,7 @@
           <p:cNvPr id="8" name="Retângulo 7">
             <a:extLst>
               <a:ext uri="{FF2B5EF4-FFF2-40B4-BE49-F238E27FC236}">
-                <a16:creationId xmlns="" xmlns:a16="http://schemas.microsoft.com/office/drawing/2014/main" id="{9B33DD69-1761-43D2-B589-CE56D2C4FBB6}"/>
+                <a16:creationId xmlns:a16="http://schemas.microsoft.com/office/drawing/2014/main" xmlns="" id="{9B33DD69-1761-43D2-B589-CE56D2C4FBB6}"/>
               </a:ext>
             </a:extLst>
           </p:cNvPr>
@@ -24599,7 +24591,7 @@
           <p:cNvPr id="9" name="CaixaDeTexto 8">
             <a:extLst>
               <a:ext uri="{FF2B5EF4-FFF2-40B4-BE49-F238E27FC236}">
-                <a16:creationId xmlns="" xmlns:a16="http://schemas.microsoft.com/office/drawing/2014/main" id="{90B980A2-8D40-4C0A-9871-4FA9794F9C3D}"/>
+                <a16:creationId xmlns:a16="http://schemas.microsoft.com/office/drawing/2014/main" xmlns="" id="{90B980A2-8D40-4C0A-9871-4FA9794F9C3D}"/>
               </a:ext>
             </a:extLst>
           </p:cNvPr>
@@ -24651,18 +24643,7 @@
                   </a:schemeClr>
                 </a:solidFill>
               </a:rPr>
-              <a:t>, veja exemplos</a:t>
-            </a:r>
-            <a:r>
-              <a:rPr lang="pt-BR" sz="2000" dirty="0" smtClean="0">
-                <a:solidFill>
-                  <a:schemeClr val="bg1">
-                    <a:lumMod val="95000"/>
-                    <a:lumOff val="5000"/>
-                  </a:schemeClr>
-                </a:solidFill>
-              </a:rPr>
-              <a:t>:</a:t>
+              <a:t>, veja exemplos:</a:t>
             </a:r>
           </a:p>
           <a:p>
@@ -25275,7 +25256,7 @@
           <p:cNvPr id="8" name="Retângulo 7">
             <a:extLst>
               <a:ext uri="{FF2B5EF4-FFF2-40B4-BE49-F238E27FC236}">
-                <a16:creationId xmlns="" xmlns:a16="http://schemas.microsoft.com/office/drawing/2014/main" id="{9B33DD69-1761-43D2-B589-CE56D2C4FBB6}"/>
+                <a16:creationId xmlns:a16="http://schemas.microsoft.com/office/drawing/2014/main" xmlns="" id="{9B33DD69-1761-43D2-B589-CE56D2C4FBB6}"/>
               </a:ext>
             </a:extLst>
           </p:cNvPr>
@@ -25411,7 +25392,7 @@
           <p:cNvPr id="9" name="CaixaDeTexto 8">
             <a:extLst>
               <a:ext uri="{FF2B5EF4-FFF2-40B4-BE49-F238E27FC236}">
-                <a16:creationId xmlns="" xmlns:a16="http://schemas.microsoft.com/office/drawing/2014/main" id="{90B980A2-8D40-4C0A-9871-4FA9794F9C3D}"/>
+                <a16:creationId xmlns:a16="http://schemas.microsoft.com/office/drawing/2014/main" xmlns="" id="{90B980A2-8D40-4C0A-9871-4FA9794F9C3D}"/>
               </a:ext>
             </a:extLst>
           </p:cNvPr>
@@ -25895,7 +25876,7 @@
           <p:cNvPr id="8" name="Retângulo 7">
             <a:extLst>
               <a:ext uri="{FF2B5EF4-FFF2-40B4-BE49-F238E27FC236}">
-                <a16:creationId xmlns="" xmlns:a16="http://schemas.microsoft.com/office/drawing/2014/main" id="{9B33DD69-1761-43D2-B589-CE56D2C4FBB6}"/>
+                <a16:creationId xmlns:a16="http://schemas.microsoft.com/office/drawing/2014/main" xmlns="" id="{9B33DD69-1761-43D2-B589-CE56D2C4FBB6}"/>
               </a:ext>
             </a:extLst>
           </p:cNvPr>
@@ -26031,7 +26012,7 @@
           <p:cNvPr id="9" name="CaixaDeTexto 8">
             <a:extLst>
               <a:ext uri="{FF2B5EF4-FFF2-40B4-BE49-F238E27FC236}">
-                <a16:creationId xmlns="" xmlns:a16="http://schemas.microsoft.com/office/drawing/2014/main" id="{90B980A2-8D40-4C0A-9871-4FA9794F9C3D}"/>
+                <a16:creationId xmlns:a16="http://schemas.microsoft.com/office/drawing/2014/main" xmlns="" id="{90B980A2-8D40-4C0A-9871-4FA9794F9C3D}"/>
               </a:ext>
             </a:extLst>
           </p:cNvPr>
@@ -26137,15 +26118,7 @@
                   <a:srgbClr val="FF0000"/>
                 </a:solidFill>
               </a:rPr>
-              <a:t>m</a:t>
-            </a:r>
-            <a:r>
-              <a:rPr lang="pt-BR" sz="2000" dirty="0" smtClean="0">
-                <a:solidFill>
-                  <a:srgbClr val="FF0000"/>
-                </a:solidFill>
-              </a:rPr>
-              <a:t>argin:</a:t>
+              <a:t>margin:</a:t>
             </a:r>
             <a:r>
               <a:rPr lang="pt-BR" sz="2000" dirty="0">
@@ -26529,7 +26502,7 @@
           <p:cNvPr id="8" name="Retângulo 7">
             <a:extLst>
               <a:ext uri="{FF2B5EF4-FFF2-40B4-BE49-F238E27FC236}">
-                <a16:creationId xmlns="" xmlns:a16="http://schemas.microsoft.com/office/drawing/2014/main" id="{9B33DD69-1761-43D2-B589-CE56D2C4FBB6}"/>
+                <a16:creationId xmlns:a16="http://schemas.microsoft.com/office/drawing/2014/main" xmlns="" id="{9B33DD69-1761-43D2-B589-CE56D2C4FBB6}"/>
               </a:ext>
             </a:extLst>
           </p:cNvPr>
@@ -26665,7 +26638,7 @@
           <p:cNvPr id="9" name="CaixaDeTexto 8">
             <a:extLst>
               <a:ext uri="{FF2B5EF4-FFF2-40B4-BE49-F238E27FC236}">
-                <a16:creationId xmlns="" xmlns:a16="http://schemas.microsoft.com/office/drawing/2014/main" id="{90B980A2-8D40-4C0A-9871-4FA9794F9C3D}"/>
+                <a16:creationId xmlns:a16="http://schemas.microsoft.com/office/drawing/2014/main" xmlns="" id="{90B980A2-8D40-4C0A-9871-4FA9794F9C3D}"/>
               </a:ext>
             </a:extLst>
           </p:cNvPr>
@@ -27047,7 +27020,7 @@
           <p:cNvPr id="2" name="Título 1">
             <a:extLst>
               <a:ext uri="{FF2B5EF4-FFF2-40B4-BE49-F238E27FC236}">
-                <a16:creationId xmlns="" xmlns:a16="http://schemas.microsoft.com/office/drawing/2014/main" id="{14AB9F69-8D24-468C-93DF-A1666924EB0C}"/>
+                <a16:creationId xmlns:a16="http://schemas.microsoft.com/office/drawing/2014/main" xmlns="" id="{14AB9F69-8D24-468C-93DF-A1666924EB0C}"/>
               </a:ext>
             </a:extLst>
           </p:cNvPr>
@@ -27078,7 +27051,7 @@
           <p:cNvPr id="3" name="Subtítulo 2">
             <a:extLst>
               <a:ext uri="{FF2B5EF4-FFF2-40B4-BE49-F238E27FC236}">
-                <a16:creationId xmlns="" xmlns:a16="http://schemas.microsoft.com/office/drawing/2014/main" id="{0E4BFB9B-D461-4F8E-B2A0-819D63FA7EC4}"/>
+                <a16:creationId xmlns:a16="http://schemas.microsoft.com/office/drawing/2014/main" xmlns="" id="{0E4BFB9B-D461-4F8E-B2A0-819D63FA7EC4}"/>
               </a:ext>
             </a:extLst>
           </p:cNvPr>
@@ -27149,7 +27122,7 @@
           <p:cNvPr id="8" name="Retângulo 7">
             <a:extLst>
               <a:ext uri="{FF2B5EF4-FFF2-40B4-BE49-F238E27FC236}">
-                <a16:creationId xmlns="" xmlns:a16="http://schemas.microsoft.com/office/drawing/2014/main" id="{9B33DD69-1761-43D2-B589-CE56D2C4FBB6}"/>
+                <a16:creationId xmlns:a16="http://schemas.microsoft.com/office/drawing/2014/main" xmlns="" id="{9B33DD69-1761-43D2-B589-CE56D2C4FBB6}"/>
               </a:ext>
             </a:extLst>
           </p:cNvPr>
@@ -27203,7 +27176,7 @@
           <p:cNvPr id="24" name="CaixaDeTexto 23">
             <a:extLst>
               <a:ext uri="{FF2B5EF4-FFF2-40B4-BE49-F238E27FC236}">
-                <a16:creationId xmlns="" xmlns:a16="http://schemas.microsoft.com/office/drawing/2014/main" id="{90B980A2-8D40-4C0A-9871-4FA9794F9C3D}"/>
+                <a16:creationId xmlns:a16="http://schemas.microsoft.com/office/drawing/2014/main" xmlns="" id="{90B980A2-8D40-4C0A-9871-4FA9794F9C3D}"/>
               </a:ext>
             </a:extLst>
           </p:cNvPr>
@@ -27636,7 +27609,7 @@
           <p:cNvPr id="8" name="Retângulo 7">
             <a:extLst>
               <a:ext uri="{FF2B5EF4-FFF2-40B4-BE49-F238E27FC236}">
-                <a16:creationId xmlns="" xmlns:a16="http://schemas.microsoft.com/office/drawing/2014/main" id="{9B33DD69-1761-43D2-B589-CE56D2C4FBB6}"/>
+                <a16:creationId xmlns:a16="http://schemas.microsoft.com/office/drawing/2014/main" xmlns="" id="{9B33DD69-1761-43D2-B589-CE56D2C4FBB6}"/>
               </a:ext>
             </a:extLst>
           </p:cNvPr>
@@ -27772,7 +27745,7 @@
           <p:cNvPr id="9" name="CaixaDeTexto 8">
             <a:extLst>
               <a:ext uri="{FF2B5EF4-FFF2-40B4-BE49-F238E27FC236}">
-                <a16:creationId xmlns="" xmlns:a16="http://schemas.microsoft.com/office/drawing/2014/main" id="{90B980A2-8D40-4C0A-9871-4FA9794F9C3D}"/>
+                <a16:creationId xmlns:a16="http://schemas.microsoft.com/office/drawing/2014/main" xmlns="" id="{90B980A2-8D40-4C0A-9871-4FA9794F9C3D}"/>
               </a:ext>
             </a:extLst>
           </p:cNvPr>
@@ -28007,7 +27980,7 @@
           <p:cNvPr id="8" name="Retângulo 7">
             <a:extLst>
               <a:ext uri="{FF2B5EF4-FFF2-40B4-BE49-F238E27FC236}">
-                <a16:creationId xmlns="" xmlns:a16="http://schemas.microsoft.com/office/drawing/2014/main" id="{9B33DD69-1761-43D2-B589-CE56D2C4FBB6}"/>
+                <a16:creationId xmlns:a16="http://schemas.microsoft.com/office/drawing/2014/main" xmlns="" id="{9B33DD69-1761-43D2-B589-CE56D2C4FBB6}"/>
               </a:ext>
             </a:extLst>
           </p:cNvPr>
@@ -28143,7 +28116,7 @@
           <p:cNvPr id="9" name="CaixaDeTexto 8">
             <a:extLst>
               <a:ext uri="{FF2B5EF4-FFF2-40B4-BE49-F238E27FC236}">
-                <a16:creationId xmlns="" xmlns:a16="http://schemas.microsoft.com/office/drawing/2014/main" id="{90B980A2-8D40-4C0A-9871-4FA9794F9C3D}"/>
+                <a16:creationId xmlns:a16="http://schemas.microsoft.com/office/drawing/2014/main" xmlns="" id="{90B980A2-8D40-4C0A-9871-4FA9794F9C3D}"/>
               </a:ext>
             </a:extLst>
           </p:cNvPr>
@@ -28195,10 +28168,10 @@
                   </a:schemeClr>
                 </a:solidFill>
               </a:rPr>
-              <a:t>conforme exemplo </a:t>
-            </a:r>
-            <a:r>
-              <a:rPr lang="pt-BR" sz="2000" dirty="0" smtClean="0">
+              <a:t>conforme exemplo abaixo. </a:t>
+            </a:r>
+            <a:r>
+              <a:rPr lang="pt-BR" sz="2000" dirty="0">
                 <a:solidFill>
                   <a:schemeClr val="bg1">
                     <a:lumMod val="95000"/>
@@ -28206,10 +28179,10 @@
                   </a:schemeClr>
                 </a:solidFill>
               </a:rPr>
-              <a:t>abaixo. </a:t>
-            </a:r>
-            <a:r>
-              <a:rPr lang="pt-BR" sz="2000" dirty="0">
+              <a:t>Seja criativo com as cores, e não esqueça da indentação, </a:t>
+            </a:r>
+            <a:r>
+              <a:rPr lang="pt-BR" sz="2000" dirty="0" smtClean="0">
                 <a:solidFill>
                   <a:schemeClr val="bg1">
                     <a:lumMod val="95000"/>
@@ -28217,7 +28190,18 @@
                   </a:schemeClr>
                 </a:solidFill>
               </a:rPr>
-              <a:t>Seja criativo com as cores, e não esqueça da indentação, dos título da página com imagem e das margins de distanciamento!</a:t>
+              <a:t>do título </a:t>
+            </a:r>
+            <a:r>
+              <a:rPr lang="pt-BR" sz="2000" dirty="0">
+                <a:solidFill>
+                  <a:schemeClr val="bg1">
+                    <a:lumMod val="95000"/>
+                    <a:lumOff val="5000"/>
+                  </a:schemeClr>
+                </a:solidFill>
+              </a:rPr>
+              <a:t>da página com imagem e das margins de distanciamento!</a:t>
             </a:r>
           </a:p>
           <a:p>
@@ -28611,7 +28595,7 @@
           <p:cNvPr id="2" name="Título 1">
             <a:extLst>
               <a:ext uri="{FF2B5EF4-FFF2-40B4-BE49-F238E27FC236}">
-                <a16:creationId xmlns="" xmlns:a16="http://schemas.microsoft.com/office/drawing/2014/main" id="{14AB9F69-8D24-468C-93DF-A1666924EB0C}"/>
+                <a16:creationId xmlns:a16="http://schemas.microsoft.com/office/drawing/2014/main" xmlns="" id="{14AB9F69-8D24-468C-93DF-A1666924EB0C}"/>
               </a:ext>
             </a:extLst>
           </p:cNvPr>
@@ -28642,7 +28626,7 @@
           <p:cNvPr id="3" name="Subtítulo 2">
             <a:extLst>
               <a:ext uri="{FF2B5EF4-FFF2-40B4-BE49-F238E27FC236}">
-                <a16:creationId xmlns="" xmlns:a16="http://schemas.microsoft.com/office/drawing/2014/main" id="{0E4BFB9B-D461-4F8E-B2A0-819D63FA7EC4}"/>
+                <a16:creationId xmlns:a16="http://schemas.microsoft.com/office/drawing/2014/main" xmlns="" id="{0E4BFB9B-D461-4F8E-B2A0-819D63FA7EC4}"/>
               </a:ext>
             </a:extLst>
           </p:cNvPr>
@@ -28709,7 +28693,7 @@
           <p:cNvPr id="8" name="Retângulo 7">
             <a:extLst>
               <a:ext uri="{FF2B5EF4-FFF2-40B4-BE49-F238E27FC236}">
-                <a16:creationId xmlns="" xmlns:a16="http://schemas.microsoft.com/office/drawing/2014/main" id="{9B33DD69-1761-43D2-B589-CE56D2C4FBB6}"/>
+                <a16:creationId xmlns:a16="http://schemas.microsoft.com/office/drawing/2014/main" xmlns="" id="{9B33DD69-1761-43D2-B589-CE56D2C4FBB6}"/>
               </a:ext>
             </a:extLst>
           </p:cNvPr>
@@ -28763,7 +28747,7 @@
           <p:cNvPr id="24" name="CaixaDeTexto 23">
             <a:extLst>
               <a:ext uri="{FF2B5EF4-FFF2-40B4-BE49-F238E27FC236}">
-                <a16:creationId xmlns="" xmlns:a16="http://schemas.microsoft.com/office/drawing/2014/main" id="{90B980A2-8D40-4C0A-9871-4FA9794F9C3D}"/>
+                <a16:creationId xmlns:a16="http://schemas.microsoft.com/office/drawing/2014/main" xmlns="" id="{90B980A2-8D40-4C0A-9871-4FA9794F9C3D}"/>
               </a:ext>
             </a:extLst>
           </p:cNvPr>
@@ -28862,19 +28846,7 @@
                 </a:solidFill>
                 <a:hlinkClick r:id="rId4"/>
               </a:rPr>
-              <a:t>https://www.w3schools.com</a:t>
-            </a:r>
-            <a:r>
-              <a:rPr lang="pt-BR" sz="2000" dirty="0" smtClean="0">
-                <a:solidFill>
-                  <a:schemeClr val="bg1">
-                    <a:lumMod val="95000"/>
-                    <a:lumOff val="5000"/>
-                  </a:schemeClr>
-                </a:solidFill>
-                <a:hlinkClick r:id="rId4"/>
-              </a:rPr>
-              <a:t>/</a:t>
+              <a:t>https://www.w3schools.com/</a:t>
             </a:r>
             <a:endParaRPr lang="pt-BR" sz="2000" dirty="0" smtClean="0">
               <a:solidFill>
@@ -29007,7 +28979,7 @@
           <p:cNvPr id="8" name="Retângulo 7">
             <a:extLst>
               <a:ext uri="{FF2B5EF4-FFF2-40B4-BE49-F238E27FC236}">
-                <a16:creationId xmlns="" xmlns:a16="http://schemas.microsoft.com/office/drawing/2014/main" id="{9B33DD69-1761-43D2-B589-CE56D2C4FBB6}"/>
+                <a16:creationId xmlns:a16="http://schemas.microsoft.com/office/drawing/2014/main" xmlns="" id="{9B33DD69-1761-43D2-B589-CE56D2C4FBB6}"/>
               </a:ext>
             </a:extLst>
           </p:cNvPr>
@@ -29061,7 +29033,7 @@
           <p:cNvPr id="24" name="CaixaDeTexto 23">
             <a:extLst>
               <a:ext uri="{FF2B5EF4-FFF2-40B4-BE49-F238E27FC236}">
-                <a16:creationId xmlns="" xmlns:a16="http://schemas.microsoft.com/office/drawing/2014/main" id="{90B980A2-8D40-4C0A-9871-4FA9794F9C3D}"/>
+                <a16:creationId xmlns:a16="http://schemas.microsoft.com/office/drawing/2014/main" xmlns="" id="{90B980A2-8D40-4C0A-9871-4FA9794F9C3D}"/>
               </a:ext>
             </a:extLst>
           </p:cNvPr>
@@ -29628,7 +29600,7 @@
           <p:cNvPr id="2" name="Título 1">
             <a:extLst>
               <a:ext uri="{FF2B5EF4-FFF2-40B4-BE49-F238E27FC236}">
-                <a16:creationId xmlns="" xmlns:a16="http://schemas.microsoft.com/office/drawing/2014/main" id="{14AB9F69-8D24-468C-93DF-A1666924EB0C}"/>
+                <a16:creationId xmlns:a16="http://schemas.microsoft.com/office/drawing/2014/main" xmlns="" id="{14AB9F69-8D24-468C-93DF-A1666924EB0C}"/>
               </a:ext>
             </a:extLst>
           </p:cNvPr>
@@ -29659,7 +29631,7 @@
           <p:cNvPr id="3" name="Subtítulo 2">
             <a:extLst>
               <a:ext uri="{FF2B5EF4-FFF2-40B4-BE49-F238E27FC236}">
-                <a16:creationId xmlns="" xmlns:a16="http://schemas.microsoft.com/office/drawing/2014/main" id="{0E4BFB9B-D461-4F8E-B2A0-819D63FA7EC4}"/>
+                <a16:creationId xmlns:a16="http://schemas.microsoft.com/office/drawing/2014/main" xmlns="" id="{0E4BFB9B-D461-4F8E-B2A0-819D63FA7EC4}"/>
               </a:ext>
             </a:extLst>
           </p:cNvPr>
@@ -29730,7 +29702,7 @@
           <p:cNvPr id="8" name="Retângulo 7">
             <a:extLst>
               <a:ext uri="{FF2B5EF4-FFF2-40B4-BE49-F238E27FC236}">
-                <a16:creationId xmlns="" xmlns:a16="http://schemas.microsoft.com/office/drawing/2014/main" id="{9B33DD69-1761-43D2-B589-CE56D2C4FBB6}"/>
+                <a16:creationId xmlns:a16="http://schemas.microsoft.com/office/drawing/2014/main" xmlns="" id="{9B33DD69-1761-43D2-B589-CE56D2C4FBB6}"/>
               </a:ext>
             </a:extLst>
           </p:cNvPr>
@@ -29784,7 +29756,7 @@
           <p:cNvPr id="24" name="CaixaDeTexto 23">
             <a:extLst>
               <a:ext uri="{FF2B5EF4-FFF2-40B4-BE49-F238E27FC236}">
-                <a16:creationId xmlns="" xmlns:a16="http://schemas.microsoft.com/office/drawing/2014/main" id="{90B980A2-8D40-4C0A-9871-4FA9794F9C3D}"/>
+                <a16:creationId xmlns:a16="http://schemas.microsoft.com/office/drawing/2014/main" xmlns="" id="{90B980A2-8D40-4C0A-9871-4FA9794F9C3D}"/>
               </a:ext>
             </a:extLst>
           </p:cNvPr>
@@ -30217,7 +30189,7 @@
           <p:cNvPr id="8" name="Retângulo 7">
             <a:extLst>
               <a:ext uri="{FF2B5EF4-FFF2-40B4-BE49-F238E27FC236}">
-                <a16:creationId xmlns="" xmlns:a16="http://schemas.microsoft.com/office/drawing/2014/main" id="{9B33DD69-1761-43D2-B589-CE56D2C4FBB6}"/>
+                <a16:creationId xmlns:a16="http://schemas.microsoft.com/office/drawing/2014/main" xmlns="" id="{9B33DD69-1761-43D2-B589-CE56D2C4FBB6}"/>
               </a:ext>
             </a:extLst>
           </p:cNvPr>
@@ -30271,7 +30243,7 @@
           <p:cNvPr id="24" name="CaixaDeTexto 23">
             <a:extLst>
               <a:ext uri="{FF2B5EF4-FFF2-40B4-BE49-F238E27FC236}">
-                <a16:creationId xmlns="" xmlns:a16="http://schemas.microsoft.com/office/drawing/2014/main" id="{90B980A2-8D40-4C0A-9871-4FA9794F9C3D}"/>
+                <a16:creationId xmlns:a16="http://schemas.microsoft.com/office/drawing/2014/main" xmlns="" id="{90B980A2-8D40-4C0A-9871-4FA9794F9C3D}"/>
               </a:ext>
             </a:extLst>
           </p:cNvPr>
@@ -30801,7 +30773,7 @@
           <p:cNvPr id="2" name="Título 1">
             <a:extLst>
               <a:ext uri="{FF2B5EF4-FFF2-40B4-BE49-F238E27FC236}">
-                <a16:creationId xmlns="" xmlns:a16="http://schemas.microsoft.com/office/drawing/2014/main" id="{14AB9F69-8D24-468C-93DF-A1666924EB0C}"/>
+                <a16:creationId xmlns:a16="http://schemas.microsoft.com/office/drawing/2014/main" xmlns="" id="{14AB9F69-8D24-468C-93DF-A1666924EB0C}"/>
               </a:ext>
             </a:extLst>
           </p:cNvPr>
@@ -30832,7 +30804,7 @@
           <p:cNvPr id="3" name="Subtítulo 2">
             <a:extLst>
               <a:ext uri="{FF2B5EF4-FFF2-40B4-BE49-F238E27FC236}">
-                <a16:creationId xmlns="" xmlns:a16="http://schemas.microsoft.com/office/drawing/2014/main" id="{0E4BFB9B-D461-4F8E-B2A0-819D63FA7EC4}"/>
+                <a16:creationId xmlns:a16="http://schemas.microsoft.com/office/drawing/2014/main" xmlns="" id="{0E4BFB9B-D461-4F8E-B2A0-819D63FA7EC4}"/>
               </a:ext>
             </a:extLst>
           </p:cNvPr>
@@ -31126,7 +31098,7 @@
   <a:extraClrSchemeLst/>
   <a:extLst>
     <a:ext uri="{05A4C25C-085E-4340-85A3-A5531E510DB2}">
-      <thm15:themeFamily xmlns="" xmlns:thm15="http://schemas.microsoft.com/office/thememl/2012/main" name="Circuit" id="{0AC2F7E7-15F5-431C-B2A2-456FE929F56C}" vid="{0911B802-464C-4241-8DD9-B60FF88E379F}"/>
+      <thm15:themeFamily xmlns:thm15="http://schemas.microsoft.com/office/thememl/2012/main" xmlns="" name="Circuit" id="{0AC2F7E7-15F5-431C-B2A2-456FE929F56C}" vid="{0911B802-464C-4241-8DD9-B60FF88E379F}"/>
     </a:ext>
   </a:extLst>
 </a:theme>

</xml_diff>